<commit_message>
Fix GenAI: Upgrade google-genai lib to 1.0.10 to support Flash model
</commit_message>
<xml_diff>
--- a/Report/Slide Đại hoc (Khoa Luan) 2025_HVT.pptx
+++ b/Report/Slide Đại hoc (Khoa Luan) 2025_HVT.pptx
@@ -650,7 +650,7 @@
           <a:p>
             <a:fld id="{03699063-EB23-4E7C-94EA-592226CD622A}" type="datetimeFigureOut">
               <a:rPr lang="en-US" smtClean="0"/>
-              <a:t>12/12/2025</a:t>
+              <a:t>12/15/2025</a:t>
             </a:fld>
             <a:endParaRPr lang="en-US"/>
           </a:p>
@@ -831,7 +831,7 @@
           <a:p>
             <a:fld id="{D3033B71-E97E-41B9-BBC9-091EC80374B8}" type="datetimeFigureOut">
               <a:rPr lang="en-US" smtClean="0"/>
-              <a:t>12/12/2025</a:t>
+              <a:t>12/15/2025</a:t>
             </a:fld>
             <a:endParaRPr lang="en-US"/>
           </a:p>
@@ -8319,116 +8319,252 @@
             <p:ph idx="1"/>
           </p:nvPr>
         </p:nvSpPr>
-        <p:spPr/>
+        <p:spPr>
+          <a:xfrm>
+            <a:off x="106259" y="1053422"/>
+            <a:ext cx="5989741" cy="4751156"/>
+          </a:xfrm>
+        </p:spPr>
         <p:txBody>
           <a:bodyPr>
-            <a:normAutofit fontScale="55000" lnSpcReduction="20000"/>
+            <a:normAutofit fontScale="62500" lnSpcReduction="20000"/>
           </a:bodyPr>
           <a:lstStyle/>
           <a:p>
-            <a:pPr>
+            <a:pPr eaLnBrk="0" fontAlgn="base" hangingPunct="0">
               <a:lnSpc>
-                <a:spcPct val="160000"/>
+                <a:spcPct val="170000"/>
               </a:lnSpc>
+              <a:spcBef>
+                <a:spcPct val="0"/>
+              </a:spcBef>
+              <a:spcAft>
+                <a:spcPct val="0"/>
+              </a:spcAft>
+              <a:buSzTx/>
             </a:pPr>
             <a:r>
-              <a:rPr lang="vi-VN" sz="4200" dirty="0"/>
-              <a:t>Mô hình: Client - Server (RESTful API).</a:t>
-            </a:r>
-          </a:p>
-          <a:p>
-            <a:pPr>
+              <a:rPr lang="vi-VN" altLang="vi-VN" dirty="0">
+                <a:solidFill>
+                  <a:schemeClr val="tx1"/>
+                </a:solidFill>
+                <a:latin typeface="+mj-lt"/>
+              </a:rPr>
+              <a:t>Mô hình:</a:t>
+            </a:r>
+            <a:r>
+              <a:rPr lang="vi-VN" altLang="vi-VN" b="0" dirty="0">
+                <a:solidFill>
+                  <a:schemeClr val="tx1"/>
+                </a:solidFill>
+                <a:latin typeface="+mj-lt"/>
+              </a:rPr>
+              <a:t> Client - Server (RESTful API).</a:t>
+            </a:r>
+          </a:p>
+          <a:p>
+            <a:pPr eaLnBrk="0" fontAlgn="base" hangingPunct="0">
               <a:lnSpc>
-                <a:spcPct val="160000"/>
+                <a:spcPct val="170000"/>
               </a:lnSpc>
+              <a:spcBef>
+                <a:spcPct val="0"/>
+              </a:spcBef>
+              <a:spcAft>
+                <a:spcPct val="0"/>
+              </a:spcAft>
+              <a:buSzTx/>
             </a:pPr>
             <a:r>
-              <a:rPr lang="vi-VN" sz="4200" dirty="0"/>
-              <a:t>Frontend: ReactJS, Tailwind CSS, Single Page Application(Hiệu ứng mượt mà).</a:t>
-            </a:r>
-          </a:p>
-          <a:p>
-            <a:pPr>
+              <a:rPr lang="vi-VN" altLang="vi-VN" dirty="0">
+                <a:solidFill>
+                  <a:schemeClr val="tx1"/>
+                </a:solidFill>
+                <a:latin typeface="+mj-lt"/>
+              </a:rPr>
+              <a:t>Frontend:</a:t>
+            </a:r>
+            <a:r>
+              <a:rPr lang="vi-VN" altLang="vi-VN" b="0" dirty="0">
+                <a:solidFill>
+                  <a:schemeClr val="tx1"/>
+                </a:solidFill>
+                <a:latin typeface="+mj-lt"/>
+              </a:rPr>
+              <a:t> ReactJS + Vite (Tối ưu tốc độ build), Tailwind CSS (Giao diện hiện đại).</a:t>
+            </a:r>
+          </a:p>
+          <a:p>
+            <a:pPr eaLnBrk="0" fontAlgn="base" hangingPunct="0">
               <a:lnSpc>
-                <a:spcPct val="160000"/>
+                <a:spcPct val="170000"/>
               </a:lnSpc>
+              <a:spcBef>
+                <a:spcPct val="0"/>
+              </a:spcBef>
+              <a:spcAft>
+                <a:spcPct val="0"/>
+              </a:spcAft>
+              <a:buSzTx/>
             </a:pPr>
             <a:r>
-              <a:rPr lang="vi-VN" sz="4200" dirty="0"/>
-              <a:t>Backend: Python FastAPI (Hiệu năng cao, xử lý bất đồng bộ).</a:t>
-            </a:r>
-          </a:p>
-          <a:p>
-            <a:pPr>
+              <a:rPr lang="vi-VN" altLang="vi-VN" dirty="0">
+                <a:solidFill>
+                  <a:schemeClr val="tx1"/>
+                </a:solidFill>
+                <a:latin typeface="+mj-lt"/>
+              </a:rPr>
+              <a:t>Backend:</a:t>
+            </a:r>
+            <a:endParaRPr lang="vi-VN" altLang="vi-VN" b="0" dirty="0">
+              <a:solidFill>
+                <a:schemeClr val="tx1"/>
+              </a:solidFill>
+              <a:latin typeface="+mj-lt"/>
+            </a:endParaRPr>
+          </a:p>
+          <a:p>
+            <a:pPr eaLnBrk="0" fontAlgn="base" hangingPunct="0">
               <a:lnSpc>
-                <a:spcPct val="160000"/>
+                <a:spcPct val="170000"/>
               </a:lnSpc>
+              <a:spcBef>
+                <a:spcPct val="0"/>
+              </a:spcBef>
+              <a:spcAft>
+                <a:spcPct val="0"/>
+              </a:spcAft>
+              <a:buSzTx/>
             </a:pPr>
             <a:r>
-              <a:rPr lang="vi-VN" sz="4200" dirty="0"/>
-              <a:t>Database: PostgreSQL (Quản lý dữ liệu quan hệ chặt chẽ).</a:t>
-            </a:r>
-          </a:p>
-          <a:p>
-            <a:pPr>
+              <a:rPr lang="vi-VN" altLang="vi-VN" dirty="0">
+                <a:solidFill>
+                  <a:schemeClr val="tx1"/>
+                </a:solidFill>
+                <a:latin typeface="+mj-lt"/>
+              </a:rPr>
+              <a:t>FastAPI (Python):</a:t>
+            </a:r>
+            <a:r>
+              <a:rPr lang="vi-VN" altLang="vi-VN" b="0" dirty="0">
+                <a:solidFill>
+                  <a:schemeClr val="tx1"/>
+                </a:solidFill>
+                <a:latin typeface="+mj-lt"/>
+              </a:rPr>
+              <a:t> Xử lý bất đồng bộ (AsyncIO) -&gt; </a:t>
+            </a:r>
+            <a:r>
+              <a:rPr lang="vi-VN" altLang="vi-VN" b="0" i="1" dirty="0">
+                <a:solidFill>
+                  <a:schemeClr val="tx1"/>
+                </a:solidFill>
+                <a:latin typeface="+mj-lt"/>
+              </a:rPr>
+              <a:t>Cực kỳ quan trọng để không bị tắc nghẽn khi gọi AI.</a:t>
+            </a:r>
+            <a:endParaRPr lang="vi-VN" altLang="vi-VN" b="0" dirty="0">
+              <a:solidFill>
+                <a:schemeClr val="tx1"/>
+              </a:solidFill>
+              <a:latin typeface="+mj-lt"/>
+            </a:endParaRPr>
+          </a:p>
+          <a:p>
+            <a:pPr eaLnBrk="0" fontAlgn="base" hangingPunct="0">
               <a:lnSpc>
-                <a:spcPct val="160000"/>
+                <a:spcPct val="170000"/>
               </a:lnSpc>
+              <a:spcBef>
+                <a:spcPct val="0"/>
+              </a:spcBef>
+              <a:spcAft>
+                <a:spcPct val="0"/>
+              </a:spcAft>
+              <a:buSzTx/>
             </a:pPr>
             <a:r>
-              <a:rPr lang="vi-VN" sz="4200" dirty="0"/>
-              <a:t>AI Integration: Google Gemini Pro + LangChain (Xử lý ngôn ngữ tự nhiên).</a:t>
-            </a:r>
-          </a:p>
-          <a:p>
-            <a:pPr>
+              <a:rPr lang="vi-VN" altLang="vi-VN" dirty="0">
+                <a:solidFill>
+                  <a:schemeClr val="tx1"/>
+                </a:solidFill>
+                <a:latin typeface="+mj-lt"/>
+              </a:rPr>
+              <a:t>SQLAlchemy (ORM):</a:t>
+            </a:r>
+            <a:r>
+              <a:rPr lang="vi-VN" altLang="vi-VN" b="0" dirty="0">
+                <a:solidFill>
+                  <a:schemeClr val="tx1"/>
+                </a:solidFill>
+                <a:latin typeface="+mj-lt"/>
+              </a:rPr>
+              <a:t> Tương tác cơ sở dữ liệu an toàn, chống SQL Injection.</a:t>
+            </a:r>
+          </a:p>
+          <a:p>
+            <a:pPr eaLnBrk="0" fontAlgn="base" hangingPunct="0">
               <a:lnSpc>
-                <a:spcPct val="160000"/>
+                <a:spcPct val="170000"/>
               </a:lnSpc>
+              <a:spcBef>
+                <a:spcPct val="0"/>
+              </a:spcBef>
+              <a:spcAft>
+                <a:spcPct val="0"/>
+              </a:spcAft>
+              <a:buSzTx/>
             </a:pPr>
             <a:r>
-              <a:rPr lang="vi-VN" sz="4200" dirty="0"/>
-              <a:t>Security:</a:t>
-            </a:r>
-          </a:p>
-          <a:p>
-            <a:pPr lvl="1">
+              <a:rPr lang="vi-VN" altLang="vi-VN" dirty="0">
+                <a:solidFill>
+                  <a:schemeClr val="tx1"/>
+                </a:solidFill>
+                <a:latin typeface="+mj-lt"/>
+              </a:rPr>
+              <a:t>Database:</a:t>
+            </a:r>
+            <a:r>
+              <a:rPr lang="vi-VN" altLang="vi-VN" b="0" dirty="0">
+                <a:solidFill>
+                  <a:schemeClr val="tx1"/>
+                </a:solidFill>
+                <a:latin typeface="+mj-lt"/>
+              </a:rPr>
+              <a:t> PostgreSQL.</a:t>
+            </a:r>
+          </a:p>
+          <a:p>
+            <a:pPr eaLnBrk="0" fontAlgn="base" hangingPunct="0">
               <a:lnSpc>
-                <a:spcPct val="160000"/>
+                <a:spcPct val="170000"/>
               </a:lnSpc>
+              <a:spcBef>
+                <a:spcPct val="0"/>
+              </a:spcBef>
+              <a:spcAft>
+                <a:spcPct val="0"/>
+              </a:spcAft>
+              <a:buSzTx/>
             </a:pPr>
             <a:r>
-              <a:rPr lang="vi-VN" sz="3400" dirty="0"/>
-              <a:t>Firebase Authentication (Xác thực cơ bản).</a:t>
-            </a:r>
-          </a:p>
-          <a:p>
-            <a:pPr lvl="1">
-              <a:lnSpc>
-                <a:spcPct val="160000"/>
-              </a:lnSpc>
-            </a:pPr>
-            <a:r>
-              <a:rPr lang="vi-VN" sz="3400" dirty="0"/>
-              <a:t>JWT &amp; Session Management (Single Device Mode).</a:t>
-            </a:r>
-          </a:p>
-          <a:p>
-            <a:pPr lvl="1">
-              <a:lnSpc>
-                <a:spcPct val="160000"/>
-              </a:lnSpc>
-            </a:pPr>
-            <a:r>
-              <a:rPr lang="vi-VN" sz="3400" dirty="0"/>
-              <a:t>TOTP Algorithm (2FA - Google Authenticator).</a:t>
-            </a:r>
-          </a:p>
-          <a:p>
-            <a:pPr marL="0" indent="0">
-              <a:buNone/>
-            </a:pPr>
-            <a:endParaRPr lang="vi-VN" dirty="0"/>
+              <a:rPr lang="vi-VN" altLang="vi-VN" b="0" i="1" dirty="0">
+                <a:solidFill>
+                  <a:schemeClr val="tx1"/>
+                </a:solidFill>
+                <a:latin typeface="+mj-lt"/>
+              </a:rPr>
+              <a:t>Lý do chọn:</a:t>
+            </a:r>
+            <a:r>
+              <a:rPr lang="vi-VN" altLang="vi-VN" b="0" dirty="0">
+                <a:solidFill>
+                  <a:schemeClr val="tx1"/>
+                </a:solidFill>
+                <a:latin typeface="+mj-lt"/>
+              </a:rPr>
+              <a:t> Hỗ trợ ACID (tính toàn vẹn) -&gt; Bắt buộc cho các giao dịch tài chính (Tiền nong phải chính xác).</a:t>
+            </a:r>
           </a:p>
         </p:txBody>
       </p:sp>
@@ -9013,7 +9149,10 @@
             <a:avLst/>
           </a:prstGeom>
           <a:solidFill>
-            <a:srgbClr val="FFFF00"/>
+            <a:schemeClr val="accent6">
+              <a:lumMod val="40000"/>
+              <a:lumOff val="60000"/>
+            </a:schemeClr>
           </a:solidFill>
           <a:ln w="12700">
             <a:solidFill>
@@ -9084,7 +9223,10 @@
           </a:prstGeom>
           <a:ln>
             <a:solidFill>
-              <a:srgbClr val="FFFF00"/>
+              <a:schemeClr val="accent1">
+                <a:lumMod val="60000"/>
+                <a:lumOff val="40000"/>
+              </a:schemeClr>
             </a:solidFill>
           </a:ln>
         </p:spPr>
@@ -9109,29 +9251,17 @@
           <a:prstGeom prst="roundRect">
             <a:avLst/>
           </a:prstGeom>
-          <a:ln w="28575">
-            <a:solidFill>
-              <a:srgbClr val="FFFF00"/>
-            </a:solidFill>
-          </a:ln>
-          <a:effectLst>
-            <a:glow rad="101600">
-              <a:schemeClr val="accent1">
-                <a:satMod val="175000"/>
-                <a:alpha val="40000"/>
-              </a:schemeClr>
-            </a:glow>
-          </a:effectLst>
+          <a:ln/>
         </p:spPr>
         <p:style>
-          <a:lnRef idx="2">
-            <a:schemeClr val="accent6"/>
+          <a:lnRef idx="1">
+            <a:schemeClr val="accent1"/>
           </a:lnRef>
-          <a:fillRef idx="1">
-            <a:schemeClr val="lt1"/>
+          <a:fillRef idx="2">
+            <a:schemeClr val="accent1"/>
           </a:fillRef>
-          <a:effectRef idx="0">
-            <a:schemeClr val="accent6"/>
+          <a:effectRef idx="1">
+            <a:schemeClr val="accent1"/>
           </a:effectRef>
           <a:fontRef idx="minor">
             <a:schemeClr val="dk1"/>
@@ -9516,9 +9646,9 @@
             <a:avLst/>
           </a:prstGeom>
           <a:solidFill>
-            <a:schemeClr val="accent1">
-              <a:lumMod val="60000"/>
-              <a:lumOff val="40000"/>
+            <a:schemeClr val="accent5">
+              <a:lumMod val="40000"/>
+              <a:lumOff val="60000"/>
             </a:schemeClr>
           </a:solidFill>
           <a:ln w="12700">
@@ -9544,9 +9674,7 @@
             <a:r>
               <a:rPr lang="en-US" sz="2800" b="1" dirty="0" err="1">
                 <a:solidFill>
-                  <a:schemeClr val="accent6">
-                    <a:lumMod val="50000"/>
-                  </a:schemeClr>
+                  <a:srgbClr val="C00000"/>
                 </a:solidFill>
                 <a:latin typeface="Times New Roman" panose="02020603050405020304" pitchFamily="18" charset="0"/>
                 <a:cs typeface="Times New Roman" panose="02020603050405020304" pitchFamily="18" charset="0"/>
@@ -9556,9 +9684,7 @@
             <a:r>
               <a:rPr lang="en-US" sz="2800" b="1" dirty="0">
                 <a:solidFill>
-                  <a:schemeClr val="accent6">
-                    <a:lumMod val="50000"/>
-                  </a:schemeClr>
+                  <a:srgbClr val="C00000"/>
                 </a:solidFill>
                 <a:latin typeface="Times New Roman" panose="02020603050405020304" pitchFamily="18" charset="0"/>
                 <a:cs typeface="Times New Roman" panose="02020603050405020304" pitchFamily="18" charset="0"/>
@@ -9568,9 +9694,7 @@
             <a:r>
               <a:rPr lang="en-US" sz="2800" b="1" dirty="0" err="1">
                 <a:solidFill>
-                  <a:schemeClr val="accent6">
-                    <a:lumMod val="50000"/>
-                  </a:schemeClr>
+                  <a:srgbClr val="C00000"/>
                 </a:solidFill>
                 <a:latin typeface="Times New Roman" panose="02020603050405020304" pitchFamily="18" charset="0"/>
                 <a:cs typeface="Times New Roman" panose="02020603050405020304" pitchFamily="18" charset="0"/>
@@ -9580,9 +9704,7 @@
             <a:r>
               <a:rPr lang="en-US" sz="2800" b="1" dirty="0">
                 <a:solidFill>
-                  <a:schemeClr val="accent6">
-                    <a:lumMod val="50000"/>
-                  </a:schemeClr>
+                  <a:srgbClr val="C00000"/>
                 </a:solidFill>
                 <a:latin typeface="Times New Roman" panose="02020603050405020304" pitchFamily="18" charset="0"/>
                 <a:cs typeface="Times New Roman" panose="02020603050405020304" pitchFamily="18" charset="0"/>
@@ -9592,9 +9714,7 @@
             <a:r>
               <a:rPr lang="en-US" sz="2800" b="1" dirty="0" err="1">
                 <a:solidFill>
-                  <a:schemeClr val="accent6">
-                    <a:lumMod val="50000"/>
-                  </a:schemeClr>
+                  <a:srgbClr val="C00000"/>
                 </a:solidFill>
                 <a:latin typeface="Times New Roman" panose="02020603050405020304" pitchFamily="18" charset="0"/>
                 <a:cs typeface="Times New Roman" panose="02020603050405020304" pitchFamily="18" charset="0"/>
@@ -9604,9 +9724,7 @@
             <a:r>
               <a:rPr lang="en-US" sz="2800" b="1" dirty="0">
                 <a:solidFill>
-                  <a:schemeClr val="accent6">
-                    <a:lumMod val="50000"/>
-                  </a:schemeClr>
+                  <a:srgbClr val="C00000"/>
                 </a:solidFill>
                 <a:latin typeface="Times New Roman" panose="02020603050405020304" pitchFamily="18" charset="0"/>
                 <a:cs typeface="Times New Roman" panose="02020603050405020304" pitchFamily="18" charset="0"/>
@@ -9616,9 +9734,7 @@
             <a:r>
               <a:rPr lang="en-US" sz="2800" b="1" dirty="0" err="1">
                 <a:solidFill>
-                  <a:schemeClr val="accent6">
-                    <a:lumMod val="50000"/>
-                  </a:schemeClr>
+                  <a:srgbClr val="C00000"/>
                 </a:solidFill>
                 <a:latin typeface="Times New Roman" panose="02020603050405020304" pitchFamily="18" charset="0"/>
                 <a:cs typeface="Times New Roman" panose="02020603050405020304" pitchFamily="18" charset="0"/>
@@ -9628,9 +9744,7 @@
             <a:r>
               <a:rPr lang="en-US" sz="2800" b="1" dirty="0">
                 <a:solidFill>
-                  <a:schemeClr val="accent6">
-                    <a:lumMod val="50000"/>
-                  </a:schemeClr>
+                  <a:srgbClr val="C00000"/>
                 </a:solidFill>
                 <a:latin typeface="Times New Roman" panose="02020603050405020304" pitchFamily="18" charset="0"/>
                 <a:cs typeface="Times New Roman" panose="02020603050405020304" pitchFamily="18" charset="0"/>
@@ -9640,9 +9754,7 @@
             <a:r>
               <a:rPr lang="en-US" sz="2800" b="1" dirty="0" err="1">
                 <a:solidFill>
-                  <a:schemeClr val="accent6">
-                    <a:lumMod val="50000"/>
-                  </a:schemeClr>
+                  <a:srgbClr val="C00000"/>
                 </a:solidFill>
                 <a:latin typeface="Times New Roman" panose="02020603050405020304" pitchFamily="18" charset="0"/>
                 <a:cs typeface="Times New Roman" panose="02020603050405020304" pitchFamily="18" charset="0"/>
@@ -9652,9 +9764,7 @@
             <a:r>
               <a:rPr lang="en-US" sz="2800" b="1" dirty="0">
                 <a:solidFill>
-                  <a:schemeClr val="accent6">
-                    <a:lumMod val="50000"/>
-                  </a:schemeClr>
+                  <a:srgbClr val="C00000"/>
                 </a:solidFill>
                 <a:latin typeface="Times New Roman" panose="02020603050405020304" pitchFamily="18" charset="0"/>
                 <a:cs typeface="Times New Roman" panose="02020603050405020304" pitchFamily="18" charset="0"/>
@@ -9663,9 +9773,7 @@
             </a:r>
             <a:endParaRPr lang="vi-VN" sz="2800" b="1" dirty="0">
               <a:solidFill>
-                <a:schemeClr val="accent6">
-                  <a:lumMod val="50000"/>
-                </a:schemeClr>
+                <a:srgbClr val="C00000"/>
               </a:solidFill>
               <a:latin typeface="Times New Roman" panose="02020603050405020304" pitchFamily="18" charset="0"/>
               <a:cs typeface="Times New Roman" panose="02020603050405020304" pitchFamily="18" charset="0"/>
@@ -9709,7 +9817,9 @@
           </a:prstGeom>
           <a:ln w="19050">
             <a:solidFill>
-              <a:srgbClr val="00B0F0"/>
+              <a:schemeClr val="accent2">
+                <a:lumMod val="75000"/>
+              </a:schemeClr>
             </a:solidFill>
           </a:ln>
         </p:spPr>
@@ -9734,29 +9844,17 @@
           <a:prstGeom prst="roundRect">
             <a:avLst/>
           </a:prstGeom>
-          <a:ln w="28575">
-            <a:solidFill>
-              <a:srgbClr val="00B0F0"/>
-            </a:solidFill>
-          </a:ln>
-          <a:effectLst>
-            <a:glow rad="101600">
-              <a:schemeClr val="accent1">
-                <a:satMod val="175000"/>
-                <a:alpha val="40000"/>
-              </a:schemeClr>
-            </a:glow>
-          </a:effectLst>
+          <a:ln/>
         </p:spPr>
         <p:style>
-          <a:lnRef idx="2">
-            <a:schemeClr val="accent6"/>
+          <a:lnRef idx="1">
+            <a:schemeClr val="accent2"/>
           </a:lnRef>
-          <a:fillRef idx="1">
-            <a:schemeClr val="lt1"/>
+          <a:fillRef idx="2">
+            <a:schemeClr val="accent2"/>
           </a:fillRef>
-          <a:effectRef idx="0">
-            <a:schemeClr val="accent6"/>
+          <a:effectRef idx="1">
+            <a:schemeClr val="accent2"/>
           </a:effectRef>
           <a:fontRef idx="minor">
             <a:schemeClr val="dk1"/>
@@ -10777,24 +10875,16 @@
           <a:prstGeom prst="rect">
             <a:avLst/>
           </a:prstGeom>
-          <a:effectLst>
-            <a:glow rad="139700">
-              <a:schemeClr val="accent1">
-                <a:satMod val="175000"/>
-                <a:alpha val="40000"/>
-              </a:schemeClr>
-            </a:glow>
-          </a:effectLst>
         </p:spPr>
         <p:style>
           <a:lnRef idx="1">
-            <a:schemeClr val="accent5"/>
+            <a:schemeClr val="accent6"/>
           </a:lnRef>
           <a:fillRef idx="2">
-            <a:schemeClr val="accent5"/>
+            <a:schemeClr val="accent6"/>
           </a:fillRef>
           <a:effectRef idx="1">
-            <a:schemeClr val="accent5"/>
+            <a:schemeClr val="accent6"/>
           </a:effectRef>
           <a:fontRef idx="minor">
             <a:schemeClr val="dk1"/>

</xml_diff>